<commit_message>
updates to Clash stuff
</commit_message>
<xml_diff>
--- a/HSTR121/ppts/Post-Punk of the early 1980s.pptx
+++ b/HSTR121/ppts/Post-Punk of the early 1980s.pptx
@@ -206,7 +206,7 @@
           <a:p>
             <a:fld id="{B0991E28-7772-4A19-A7BA-2076E62D44B9}" type="datetimeFigureOut">
               <a:rPr lang="en-US" smtClean="0"/>
-              <a:t>12/7/2016</a:t>
+              <a:t>3/23/18</a:t>
             </a:fld>
             <a:endParaRPr lang="en-US"/>
           </a:p>
@@ -270,38 +270,37 @@
           <a:p>
             <a:pPr lvl="0"/>
             <a:r>
-              <a:rPr lang="en-US" smtClean="0"/>
+              <a:rPr lang="en-US"/>
               <a:t>Click to edit Master text styles</a:t>
             </a:r>
           </a:p>
           <a:p>
             <a:pPr lvl="1"/>
             <a:r>
-              <a:rPr lang="en-US" smtClean="0"/>
+              <a:rPr lang="en-US"/>
               <a:t>Second level</a:t>
             </a:r>
           </a:p>
           <a:p>
             <a:pPr lvl="2"/>
             <a:r>
-              <a:rPr lang="en-US" smtClean="0"/>
+              <a:rPr lang="en-US"/>
               <a:t>Third level</a:t>
             </a:r>
           </a:p>
           <a:p>
             <a:pPr lvl="3"/>
             <a:r>
-              <a:rPr lang="en-US" smtClean="0"/>
+              <a:rPr lang="en-US"/>
               <a:t>Fourth level</a:t>
             </a:r>
           </a:p>
           <a:p>
             <a:pPr lvl="4"/>
             <a:r>
-              <a:rPr lang="en-US" smtClean="0"/>
+              <a:rPr lang="en-US"/>
               <a:t>Fifth level</a:t>
             </a:r>
-            <a:endParaRPr lang="en-US"/>
           </a:p>
         </p:txBody>
       </p:sp>
@@ -536,11 +535,11 @@
               <a:defRPr/>
             </a:pPr>
             <a:r>
-              <a:rPr lang="en-US" b="0" dirty="0" smtClean="0"/>
+              <a:rPr lang="en-US" b="0" dirty="0"/>
               <a:t>Source:  Joe Strummer, “</a:t>
             </a:r>
             <a:r>
-              <a:rPr lang="en-US" sz="1200" b="0" i="0" kern="1200" dirty="0" smtClean="0">
+              <a:rPr lang="en-US" sz="1200" b="0" i="0" kern="1200" dirty="0">
                 <a:solidFill>
                   <a:schemeClr val="tx1"/>
                 </a:solidFill>
@@ -552,7 +551,7 @@
               <a:t>Ex-Clash Singer Breaks Ground”, accessed 9 December 2015:  </a:t>
             </a:r>
             <a:r>
-              <a:rPr lang="en-US" sz="1200" b="0" i="1" kern="1200" dirty="0" smtClean="0">
+              <a:rPr lang="en-US" sz="1200" b="0" i="1" kern="1200" dirty="0">
                 <a:solidFill>
                   <a:schemeClr val="tx1"/>
                 </a:solidFill>
@@ -648,18 +647,17 @@
           <a:lstStyle/>
           <a:p>
             <a:r>
-              <a:rPr lang="en-US" dirty="0" smtClean="0"/>
+              <a:rPr lang="en-US" dirty="0"/>
               <a:t>Caroline Coon, </a:t>
             </a:r>
             <a:r>
-              <a:rPr lang="en-US" i="1" dirty="0" smtClean="0"/>
+              <a:rPr lang="en-US" i="1" dirty="0"/>
               <a:t>The New Wave Punk Rock Explosion </a:t>
             </a:r>
             <a:r>
-              <a:rPr lang="en-US" dirty="0" smtClean="0"/>
+              <a:rPr lang="en-US" dirty="0"/>
               <a:t>(New York: Hawthorn, 1988).</a:t>
             </a:r>
-            <a:endParaRPr lang="en-US" dirty="0"/>
           </a:p>
         </p:txBody>
       </p:sp>
@@ -741,10 +739,9 @@
           </a:lstStyle>
           <a:p>
             <a:r>
-              <a:rPr lang="en-US" smtClean="0"/>
+              <a:rPr lang="en-US"/>
               <a:t>Click to edit Master title style</a:t>
             </a:r>
-            <a:endParaRPr lang="en-US"/>
           </a:p>
         </p:txBody>
       </p:sp>
@@ -806,10 +803,9 @@
           </a:lstStyle>
           <a:p>
             <a:r>
-              <a:rPr lang="en-US" smtClean="0"/>
+              <a:rPr lang="en-US"/>
               <a:t>Click to edit Master subtitle style</a:t>
             </a:r>
-            <a:endParaRPr lang="en-US"/>
           </a:p>
         </p:txBody>
       </p:sp>
@@ -830,7 +826,7 @@
           <a:p>
             <a:fld id="{01989256-A837-4CC9-8CE2-E5689CB71713}" type="datetimeFigureOut">
               <a:rPr lang="en-US" smtClean="0"/>
-              <a:t>12/7/2016</a:t>
+              <a:t>3/23/18</a:t>
             </a:fld>
             <a:endParaRPr lang="en-US"/>
           </a:p>
@@ -924,10 +920,9 @@
           <a:lstStyle/>
           <a:p>
             <a:r>
-              <a:rPr lang="en-US" smtClean="0"/>
+              <a:rPr lang="en-US"/>
               <a:t>Click to edit Master title style</a:t>
             </a:r>
-            <a:endParaRPr lang="en-US"/>
           </a:p>
         </p:txBody>
       </p:sp>
@@ -948,38 +943,37 @@
           <a:p>
             <a:pPr lvl="0"/>
             <a:r>
-              <a:rPr lang="en-US" smtClean="0"/>
+              <a:rPr lang="en-US"/>
               <a:t>Click to edit Master text styles</a:t>
             </a:r>
           </a:p>
           <a:p>
             <a:pPr lvl="1"/>
             <a:r>
-              <a:rPr lang="en-US" smtClean="0"/>
+              <a:rPr lang="en-US"/>
               <a:t>Second level</a:t>
             </a:r>
           </a:p>
           <a:p>
             <a:pPr lvl="2"/>
             <a:r>
-              <a:rPr lang="en-US" smtClean="0"/>
+              <a:rPr lang="en-US"/>
               <a:t>Third level</a:t>
             </a:r>
           </a:p>
           <a:p>
             <a:pPr lvl="3"/>
             <a:r>
-              <a:rPr lang="en-US" smtClean="0"/>
+              <a:rPr lang="en-US"/>
               <a:t>Fourth level</a:t>
             </a:r>
           </a:p>
           <a:p>
             <a:pPr lvl="4"/>
             <a:r>
-              <a:rPr lang="en-US" smtClean="0"/>
+              <a:rPr lang="en-US"/>
               <a:t>Fifth level</a:t>
             </a:r>
-            <a:endParaRPr lang="en-US"/>
           </a:p>
         </p:txBody>
       </p:sp>
@@ -1000,7 +994,7 @@
           <a:p>
             <a:fld id="{01989256-A837-4CC9-8CE2-E5689CB71713}" type="datetimeFigureOut">
               <a:rPr lang="en-US" smtClean="0"/>
-              <a:t>12/7/2016</a:t>
+              <a:t>3/23/18</a:t>
             </a:fld>
             <a:endParaRPr lang="en-US"/>
           </a:p>
@@ -1099,10 +1093,9 @@
           <a:lstStyle/>
           <a:p>
             <a:r>
-              <a:rPr lang="en-US" smtClean="0"/>
+              <a:rPr lang="en-US"/>
               <a:t>Click to edit Master title style</a:t>
             </a:r>
-            <a:endParaRPr lang="en-US"/>
           </a:p>
         </p:txBody>
       </p:sp>
@@ -1128,38 +1121,37 @@
           <a:p>
             <a:pPr lvl="0"/>
             <a:r>
-              <a:rPr lang="en-US" smtClean="0"/>
+              <a:rPr lang="en-US"/>
               <a:t>Click to edit Master text styles</a:t>
             </a:r>
           </a:p>
           <a:p>
             <a:pPr lvl="1"/>
             <a:r>
-              <a:rPr lang="en-US" smtClean="0"/>
+              <a:rPr lang="en-US"/>
               <a:t>Second level</a:t>
             </a:r>
           </a:p>
           <a:p>
             <a:pPr lvl="2"/>
             <a:r>
-              <a:rPr lang="en-US" smtClean="0"/>
+              <a:rPr lang="en-US"/>
               <a:t>Third level</a:t>
             </a:r>
           </a:p>
           <a:p>
             <a:pPr lvl="3"/>
             <a:r>
-              <a:rPr lang="en-US" smtClean="0"/>
+              <a:rPr lang="en-US"/>
               <a:t>Fourth level</a:t>
             </a:r>
           </a:p>
           <a:p>
             <a:pPr lvl="4"/>
             <a:r>
-              <a:rPr lang="en-US" smtClean="0"/>
+              <a:rPr lang="en-US"/>
               <a:t>Fifth level</a:t>
             </a:r>
-            <a:endParaRPr lang="en-US"/>
           </a:p>
         </p:txBody>
       </p:sp>
@@ -1180,7 +1172,7 @@
           <a:p>
             <a:fld id="{01989256-A837-4CC9-8CE2-E5689CB71713}" type="datetimeFigureOut">
               <a:rPr lang="en-US" smtClean="0"/>
-              <a:t>12/7/2016</a:t>
+              <a:t>3/23/18</a:t>
             </a:fld>
             <a:endParaRPr lang="en-US"/>
           </a:p>
@@ -1274,10 +1266,9 @@
           <a:lstStyle/>
           <a:p>
             <a:r>
-              <a:rPr lang="en-US" smtClean="0"/>
+              <a:rPr lang="en-US"/>
               <a:t>Click to edit Master title style</a:t>
             </a:r>
-            <a:endParaRPr lang="en-US"/>
           </a:p>
         </p:txBody>
       </p:sp>
@@ -1298,38 +1289,37 @@
           <a:p>
             <a:pPr lvl="0"/>
             <a:r>
-              <a:rPr lang="en-US" smtClean="0"/>
+              <a:rPr lang="en-US"/>
               <a:t>Click to edit Master text styles</a:t>
             </a:r>
           </a:p>
           <a:p>
             <a:pPr lvl="1"/>
             <a:r>
-              <a:rPr lang="en-US" smtClean="0"/>
+              <a:rPr lang="en-US"/>
               <a:t>Second level</a:t>
             </a:r>
           </a:p>
           <a:p>
             <a:pPr lvl="2"/>
             <a:r>
-              <a:rPr lang="en-US" smtClean="0"/>
+              <a:rPr lang="en-US"/>
               <a:t>Third level</a:t>
             </a:r>
           </a:p>
           <a:p>
             <a:pPr lvl="3"/>
             <a:r>
-              <a:rPr lang="en-US" smtClean="0"/>
+              <a:rPr lang="en-US"/>
               <a:t>Fourth level</a:t>
             </a:r>
           </a:p>
           <a:p>
             <a:pPr lvl="4"/>
             <a:r>
-              <a:rPr lang="en-US" smtClean="0"/>
+              <a:rPr lang="en-US"/>
               <a:t>Fifth level</a:t>
             </a:r>
-            <a:endParaRPr lang="en-US"/>
           </a:p>
         </p:txBody>
       </p:sp>
@@ -1350,7 +1340,7 @@
           <a:p>
             <a:fld id="{01989256-A837-4CC9-8CE2-E5689CB71713}" type="datetimeFigureOut">
               <a:rPr lang="en-US" smtClean="0"/>
-              <a:t>12/7/2016</a:t>
+              <a:t>3/23/18</a:t>
             </a:fld>
             <a:endParaRPr lang="en-US"/>
           </a:p>
@@ -1453,10 +1443,9 @@
           </a:lstStyle>
           <a:p>
             <a:r>
-              <a:rPr lang="en-US" smtClean="0"/>
+              <a:rPr lang="en-US"/>
               <a:t>Click to edit Master title style</a:t>
             </a:r>
-            <a:endParaRPr lang="en-US"/>
           </a:p>
         </p:txBody>
       </p:sp>
@@ -1573,7 +1562,7 @@
           <a:p>
             <a:pPr lvl="0"/>
             <a:r>
-              <a:rPr lang="en-US" smtClean="0"/>
+              <a:rPr lang="en-US"/>
               <a:t>Click to edit Master text styles</a:t>
             </a:r>
           </a:p>
@@ -1596,7 +1585,7 @@
           <a:p>
             <a:fld id="{01989256-A837-4CC9-8CE2-E5689CB71713}" type="datetimeFigureOut">
               <a:rPr lang="en-US" smtClean="0"/>
-              <a:t>12/7/2016</a:t>
+              <a:t>3/23/18</a:t>
             </a:fld>
             <a:endParaRPr lang="en-US"/>
           </a:p>
@@ -1690,10 +1679,9 @@
           <a:lstStyle/>
           <a:p>
             <a:r>
-              <a:rPr lang="en-US" smtClean="0"/>
+              <a:rPr lang="en-US"/>
               <a:t>Click to edit Master title style</a:t>
             </a:r>
-            <a:endParaRPr lang="en-US"/>
           </a:p>
         </p:txBody>
       </p:sp>
@@ -1719,38 +1707,37 @@
           <a:p>
             <a:pPr lvl="0"/>
             <a:r>
-              <a:rPr lang="en-US" smtClean="0"/>
+              <a:rPr lang="en-US"/>
               <a:t>Click to edit Master text styles</a:t>
             </a:r>
           </a:p>
           <a:p>
             <a:pPr lvl="1"/>
             <a:r>
-              <a:rPr lang="en-US" smtClean="0"/>
+              <a:rPr lang="en-US"/>
               <a:t>Second level</a:t>
             </a:r>
           </a:p>
           <a:p>
             <a:pPr lvl="2"/>
             <a:r>
-              <a:rPr lang="en-US" smtClean="0"/>
+              <a:rPr lang="en-US"/>
               <a:t>Third level</a:t>
             </a:r>
           </a:p>
           <a:p>
             <a:pPr lvl="3"/>
             <a:r>
-              <a:rPr lang="en-US" smtClean="0"/>
+              <a:rPr lang="en-US"/>
               <a:t>Fourth level</a:t>
             </a:r>
           </a:p>
           <a:p>
             <a:pPr lvl="4"/>
             <a:r>
-              <a:rPr lang="en-US" smtClean="0"/>
+              <a:rPr lang="en-US"/>
               <a:t>Fifth level</a:t>
             </a:r>
-            <a:endParaRPr lang="en-US"/>
           </a:p>
         </p:txBody>
       </p:sp>
@@ -1776,38 +1763,37 @@
           <a:p>
             <a:pPr lvl="0"/>
             <a:r>
-              <a:rPr lang="en-US" smtClean="0"/>
+              <a:rPr lang="en-US"/>
               <a:t>Click to edit Master text styles</a:t>
             </a:r>
           </a:p>
           <a:p>
             <a:pPr lvl="1"/>
             <a:r>
-              <a:rPr lang="en-US" smtClean="0"/>
+              <a:rPr lang="en-US"/>
               <a:t>Second level</a:t>
             </a:r>
           </a:p>
           <a:p>
             <a:pPr lvl="2"/>
             <a:r>
-              <a:rPr lang="en-US" smtClean="0"/>
+              <a:rPr lang="en-US"/>
               <a:t>Third level</a:t>
             </a:r>
           </a:p>
           <a:p>
             <a:pPr lvl="3"/>
             <a:r>
-              <a:rPr lang="en-US" smtClean="0"/>
+              <a:rPr lang="en-US"/>
               <a:t>Fourth level</a:t>
             </a:r>
           </a:p>
           <a:p>
             <a:pPr lvl="4"/>
             <a:r>
-              <a:rPr lang="en-US" smtClean="0"/>
+              <a:rPr lang="en-US"/>
               <a:t>Fifth level</a:t>
             </a:r>
-            <a:endParaRPr lang="en-US"/>
           </a:p>
         </p:txBody>
       </p:sp>
@@ -1828,7 +1814,7 @@
           <a:p>
             <a:fld id="{01989256-A837-4CC9-8CE2-E5689CB71713}" type="datetimeFigureOut">
               <a:rPr lang="en-US" smtClean="0"/>
-              <a:t>12/7/2016</a:t>
+              <a:t>3/23/18</a:t>
             </a:fld>
             <a:endParaRPr lang="en-US"/>
           </a:p>
@@ -1927,10 +1913,9 @@
           <a:lstStyle/>
           <a:p>
             <a:r>
-              <a:rPr lang="en-US" smtClean="0"/>
+              <a:rPr lang="en-US"/>
               <a:t>Click to edit Master title style</a:t>
             </a:r>
-            <a:endParaRPr lang="en-US"/>
           </a:p>
         </p:txBody>
       </p:sp>
@@ -1993,7 +1978,7 @@
           <a:p>
             <a:pPr lvl="0"/>
             <a:r>
-              <a:rPr lang="en-US" smtClean="0"/>
+              <a:rPr lang="en-US"/>
               <a:t>Click to edit Master text styles</a:t>
             </a:r>
           </a:p>
@@ -2021,38 +2006,37 @@
           <a:p>
             <a:pPr lvl="0"/>
             <a:r>
-              <a:rPr lang="en-US" smtClean="0"/>
+              <a:rPr lang="en-US"/>
               <a:t>Click to edit Master text styles</a:t>
             </a:r>
           </a:p>
           <a:p>
             <a:pPr lvl="1"/>
             <a:r>
-              <a:rPr lang="en-US" smtClean="0"/>
+              <a:rPr lang="en-US"/>
               <a:t>Second level</a:t>
             </a:r>
           </a:p>
           <a:p>
             <a:pPr lvl="2"/>
             <a:r>
-              <a:rPr lang="en-US" smtClean="0"/>
+              <a:rPr lang="en-US"/>
               <a:t>Third level</a:t>
             </a:r>
           </a:p>
           <a:p>
             <a:pPr lvl="3"/>
             <a:r>
-              <a:rPr lang="en-US" smtClean="0"/>
+              <a:rPr lang="en-US"/>
               <a:t>Fourth level</a:t>
             </a:r>
           </a:p>
           <a:p>
             <a:pPr lvl="4"/>
             <a:r>
-              <a:rPr lang="en-US" smtClean="0"/>
+              <a:rPr lang="en-US"/>
               <a:t>Fifth level</a:t>
             </a:r>
-            <a:endParaRPr lang="en-US"/>
           </a:p>
         </p:txBody>
       </p:sp>
@@ -2115,7 +2099,7 @@
           <a:p>
             <a:pPr lvl="0"/>
             <a:r>
-              <a:rPr lang="en-US" smtClean="0"/>
+              <a:rPr lang="en-US"/>
               <a:t>Click to edit Master text styles</a:t>
             </a:r>
           </a:p>
@@ -2143,38 +2127,37 @@
           <a:p>
             <a:pPr lvl="0"/>
             <a:r>
-              <a:rPr lang="en-US" smtClean="0"/>
+              <a:rPr lang="en-US"/>
               <a:t>Click to edit Master text styles</a:t>
             </a:r>
           </a:p>
           <a:p>
             <a:pPr lvl="1"/>
             <a:r>
-              <a:rPr lang="en-US" smtClean="0"/>
+              <a:rPr lang="en-US"/>
               <a:t>Second level</a:t>
             </a:r>
           </a:p>
           <a:p>
             <a:pPr lvl="2"/>
             <a:r>
-              <a:rPr lang="en-US" smtClean="0"/>
+              <a:rPr lang="en-US"/>
               <a:t>Third level</a:t>
             </a:r>
           </a:p>
           <a:p>
             <a:pPr lvl="3"/>
             <a:r>
-              <a:rPr lang="en-US" smtClean="0"/>
+              <a:rPr lang="en-US"/>
               <a:t>Fourth level</a:t>
             </a:r>
           </a:p>
           <a:p>
             <a:pPr lvl="4"/>
             <a:r>
-              <a:rPr lang="en-US" smtClean="0"/>
+              <a:rPr lang="en-US"/>
               <a:t>Fifth level</a:t>
             </a:r>
-            <a:endParaRPr lang="en-US"/>
           </a:p>
         </p:txBody>
       </p:sp>
@@ -2195,7 +2178,7 @@
           <a:p>
             <a:fld id="{01989256-A837-4CC9-8CE2-E5689CB71713}" type="datetimeFigureOut">
               <a:rPr lang="en-US" smtClean="0"/>
-              <a:t>12/7/2016</a:t>
+              <a:t>3/23/18</a:t>
             </a:fld>
             <a:endParaRPr lang="en-US"/>
           </a:p>
@@ -2289,10 +2272,9 @@
           <a:lstStyle/>
           <a:p>
             <a:r>
-              <a:rPr lang="en-US" smtClean="0"/>
+              <a:rPr lang="en-US"/>
               <a:t>Click to edit Master title style</a:t>
             </a:r>
-            <a:endParaRPr lang="en-US"/>
           </a:p>
         </p:txBody>
       </p:sp>
@@ -2313,7 +2295,7 @@
           <a:p>
             <a:fld id="{01989256-A837-4CC9-8CE2-E5689CB71713}" type="datetimeFigureOut">
               <a:rPr lang="en-US" smtClean="0"/>
-              <a:t>12/7/2016</a:t>
+              <a:t>3/23/18</a:t>
             </a:fld>
             <a:endParaRPr lang="en-US"/>
           </a:p>
@@ -2408,7 +2390,7 @@
           <a:p>
             <a:fld id="{01989256-A837-4CC9-8CE2-E5689CB71713}" type="datetimeFigureOut">
               <a:rPr lang="en-US" smtClean="0"/>
-              <a:t>12/7/2016</a:t>
+              <a:t>3/23/18</a:t>
             </a:fld>
             <a:endParaRPr lang="en-US"/>
           </a:p>
@@ -2511,10 +2493,9 @@
           </a:lstStyle>
           <a:p>
             <a:r>
-              <a:rPr lang="en-US" smtClean="0"/>
+              <a:rPr lang="en-US"/>
               <a:t>Click to edit Master title style</a:t>
             </a:r>
-            <a:endParaRPr lang="en-US"/>
           </a:p>
         </p:txBody>
       </p:sp>
@@ -2568,38 +2549,37 @@
           <a:p>
             <a:pPr lvl="0"/>
             <a:r>
-              <a:rPr lang="en-US" smtClean="0"/>
+              <a:rPr lang="en-US"/>
               <a:t>Click to edit Master text styles</a:t>
             </a:r>
           </a:p>
           <a:p>
             <a:pPr lvl="1"/>
             <a:r>
-              <a:rPr lang="en-US" smtClean="0"/>
+              <a:rPr lang="en-US"/>
               <a:t>Second level</a:t>
             </a:r>
           </a:p>
           <a:p>
             <a:pPr lvl="2"/>
             <a:r>
-              <a:rPr lang="en-US" smtClean="0"/>
+              <a:rPr lang="en-US"/>
               <a:t>Third level</a:t>
             </a:r>
           </a:p>
           <a:p>
             <a:pPr lvl="3"/>
             <a:r>
-              <a:rPr lang="en-US" smtClean="0"/>
+              <a:rPr lang="en-US"/>
               <a:t>Fourth level</a:t>
             </a:r>
           </a:p>
           <a:p>
             <a:pPr lvl="4"/>
             <a:r>
-              <a:rPr lang="en-US" smtClean="0"/>
+              <a:rPr lang="en-US"/>
               <a:t>Fifth level</a:t>
             </a:r>
-            <a:endParaRPr lang="en-US"/>
           </a:p>
         </p:txBody>
       </p:sp>
@@ -2662,7 +2642,7 @@
           <a:p>
             <a:pPr lvl="0"/>
             <a:r>
-              <a:rPr lang="en-US" smtClean="0"/>
+              <a:rPr lang="en-US"/>
               <a:t>Click to edit Master text styles</a:t>
             </a:r>
           </a:p>
@@ -2685,7 +2665,7 @@
           <a:p>
             <a:fld id="{01989256-A837-4CC9-8CE2-E5689CB71713}" type="datetimeFigureOut">
               <a:rPr lang="en-US" smtClean="0"/>
-              <a:t>12/7/2016</a:t>
+              <a:t>3/23/18</a:t>
             </a:fld>
             <a:endParaRPr lang="en-US"/>
           </a:p>
@@ -2788,10 +2768,9 @@
           </a:lstStyle>
           <a:p>
             <a:r>
-              <a:rPr lang="en-US" smtClean="0"/>
+              <a:rPr lang="en-US"/>
               <a:t>Click to edit Master title style</a:t>
             </a:r>
-            <a:endParaRPr lang="en-US"/>
           </a:p>
         </p:txBody>
       </p:sp>
@@ -2915,7 +2894,7 @@
           <a:p>
             <a:pPr lvl="0"/>
             <a:r>
-              <a:rPr lang="en-US" smtClean="0"/>
+              <a:rPr lang="en-US"/>
               <a:t>Click to edit Master text styles</a:t>
             </a:r>
           </a:p>
@@ -2938,7 +2917,7 @@
           <a:p>
             <a:fld id="{01989256-A837-4CC9-8CE2-E5689CB71713}" type="datetimeFigureOut">
               <a:rPr lang="en-US" smtClean="0"/>
-              <a:t>12/7/2016</a:t>
+              <a:t>3/23/18</a:t>
             </a:fld>
             <a:endParaRPr lang="en-US"/>
           </a:p>
@@ -3057,10 +3036,9 @@
           <a:lstStyle/>
           <a:p>
             <a:r>
-              <a:rPr lang="en-US" smtClean="0"/>
+              <a:rPr lang="en-US"/>
               <a:t>Click to edit Master title style</a:t>
             </a:r>
-            <a:endParaRPr lang="en-US"/>
           </a:p>
         </p:txBody>
       </p:sp>
@@ -3091,38 +3069,37 @@
           <a:p>
             <a:pPr lvl="0"/>
             <a:r>
-              <a:rPr lang="en-US" smtClean="0"/>
+              <a:rPr lang="en-US"/>
               <a:t>Click to edit Master text styles</a:t>
             </a:r>
           </a:p>
           <a:p>
             <a:pPr lvl="1"/>
             <a:r>
-              <a:rPr lang="en-US" smtClean="0"/>
+              <a:rPr lang="en-US"/>
               <a:t>Second level</a:t>
             </a:r>
           </a:p>
           <a:p>
             <a:pPr lvl="2"/>
             <a:r>
-              <a:rPr lang="en-US" smtClean="0"/>
+              <a:rPr lang="en-US"/>
               <a:t>Third level</a:t>
             </a:r>
           </a:p>
           <a:p>
             <a:pPr lvl="3"/>
             <a:r>
-              <a:rPr lang="en-US" smtClean="0"/>
+              <a:rPr lang="en-US"/>
               <a:t>Fourth level</a:t>
             </a:r>
           </a:p>
           <a:p>
             <a:pPr lvl="4"/>
             <a:r>
-              <a:rPr lang="en-US" smtClean="0"/>
+              <a:rPr lang="en-US"/>
               <a:t>Fifth level</a:t>
             </a:r>
-            <a:endParaRPr lang="en-US"/>
           </a:p>
         </p:txBody>
       </p:sp>
@@ -3161,7 +3138,7 @@
           <a:p>
             <a:fld id="{01989256-A837-4CC9-8CE2-E5689CB71713}" type="datetimeFigureOut">
               <a:rPr lang="en-US" smtClean="0"/>
-              <a:t>12/7/2016</a:t>
+              <a:t>3/23/18</a:t>
             </a:fld>
             <a:endParaRPr lang="en-US"/>
           </a:p>
@@ -3589,14 +3566,14 @@
           <a:lstStyle/>
           <a:p>
             <a:r>
-              <a:rPr lang="en-US" sz="9600" dirty="0" smtClean="0">
+              <a:rPr lang="en-US" sz="9600" dirty="0">
                 <a:latin typeface="Aharoni" panose="02010803020104030203" pitchFamily="2" charset="-79"/>
                 <a:cs typeface="Aharoni" panose="02010803020104030203" pitchFamily="2" charset="-79"/>
               </a:rPr>
               <a:t>Post-Punk </a:t>
             </a:r>
             <a:br>
-              <a:rPr lang="en-US" sz="9600" dirty="0" smtClean="0">
+              <a:rPr lang="en-US" sz="9600" dirty="0">
                 <a:latin typeface="Aharoni" panose="02010803020104030203" pitchFamily="2" charset="-79"/>
                 <a:cs typeface="Aharoni" panose="02010803020104030203" pitchFamily="2" charset="-79"/>
               </a:rPr>
@@ -3646,13 +3623,6 @@
   <p:clrMapOvr>
     <a:masterClrMapping/>
   </p:clrMapOvr>
-  <p:timing>
-    <p:tnLst>
-      <p:par>
-        <p:cTn id="1" dur="indefinite" restart="never" nodeType="tmRoot"/>
-      </p:par>
-    </p:tnLst>
-  </p:timing>
 </p:sld>
 </file>
 
@@ -3691,10 +3661,9 @@
           <a:lstStyle/>
           <a:p>
             <a:r>
-              <a:rPr lang="en-US" sz="6000" b="1" dirty="0" smtClean="0"/>
+              <a:rPr lang="en-US" sz="6000" b="1" dirty="0"/>
               <a:t>The Dead Kennedys, 1978-1986</a:t>
             </a:r>
-            <a:endParaRPr lang="en-US" sz="6000" b="1" dirty="0"/>
           </a:p>
         </p:txBody>
       </p:sp>
@@ -3714,58 +3683,38 @@
           <a:lstStyle/>
           <a:p>
             <a:r>
-              <a:rPr lang="en-US" dirty="0" smtClean="0"/>
+              <a:rPr lang="en-US" dirty="0"/>
               <a:t>Formed 1978 in San Francisco, CA, USA</a:t>
             </a:r>
           </a:p>
           <a:p>
             <a:r>
-              <a:rPr lang="en-US" dirty="0" smtClean="0"/>
+              <a:rPr lang="en-US" dirty="0"/>
               <a:t>Original lineup: </a:t>
             </a:r>
           </a:p>
           <a:p>
             <a:pPr lvl="1"/>
             <a:r>
-              <a:rPr lang="en-US" dirty="0" err="1" smtClean="0"/>
+              <a:rPr lang="en-US" dirty="0" err="1"/>
               <a:t>Jello</a:t>
             </a:r>
             <a:r>
-              <a:rPr lang="en-US" dirty="0" smtClean="0"/>
-              <a:t> </a:t>
-            </a:r>
-            <a:r>
-              <a:rPr lang="en-US" dirty="0"/>
-              <a:t>Biafra (Eric Reed Boucher) on </a:t>
-            </a:r>
-            <a:r>
-              <a:rPr lang="en-US" dirty="0" smtClean="0"/>
-              <a:t>vocals</a:t>
+              <a:rPr lang="en-US" dirty="0"/>
+              <a:t> Biafra (Eric Reed Boucher) on vocals</a:t>
             </a:r>
           </a:p>
           <a:p>
             <a:pPr lvl="1"/>
             <a:r>
-              <a:rPr lang="en-US" dirty="0" smtClean="0"/>
-              <a:t>East </a:t>
-            </a:r>
-            <a:r>
-              <a:rPr lang="en-US" dirty="0"/>
-              <a:t>Bay Ray </a:t>
-            </a:r>
-            <a:r>
-              <a:rPr lang="en-US" dirty="0"/>
-              <a:t>(Raymond Pepperell</a:t>
-            </a:r>
-            <a:r>
-              <a:rPr lang="en-US" dirty="0" smtClean="0"/>
-              <a:t>) on guitar</a:t>
+              <a:rPr lang="en-US" dirty="0"/>
+              <a:t>East Bay Ray (Raymond Pepperell) on guitar</a:t>
             </a:r>
           </a:p>
           <a:p>
             <a:pPr lvl="1"/>
             <a:r>
-              <a:rPr lang="en-US" dirty="0" smtClean="0"/>
+              <a:rPr lang="en-US" dirty="0"/>
               <a:t>Klaus </a:t>
             </a:r>
             <a:r>
@@ -3782,22 +3731,14 @@
             </a:r>
             <a:r>
               <a:rPr lang="en-US" dirty="0"/>
-              <a:t>) on </a:t>
-            </a:r>
-            <a:r>
-              <a:rPr lang="en-US" dirty="0" smtClean="0"/>
-              <a:t>bass</a:t>
+              <a:t>) on bass</a:t>
             </a:r>
           </a:p>
           <a:p>
             <a:pPr lvl="1"/>
             <a:r>
-              <a:rPr lang="en-US" dirty="0" smtClean="0"/>
-              <a:t>Ted </a:t>
-            </a:r>
-            <a:r>
-              <a:rPr lang="en-US" dirty="0"/>
-              <a:t>(Bruce </a:t>
+              <a:rPr lang="en-US" dirty="0"/>
+              <a:t>Ted (Bruce </a:t>
             </a:r>
             <a:r>
               <a:rPr lang="en-US" dirty="0" err="1"/>
@@ -3805,46 +3746,36 @@
             </a:r>
             <a:r>
               <a:rPr lang="en-US" dirty="0"/>
-              <a:t>) on </a:t>
-            </a:r>
-            <a:r>
-              <a:rPr lang="en-US" dirty="0" smtClean="0"/>
-              <a:t>drums</a:t>
+              <a:t>) on drums</a:t>
             </a:r>
           </a:p>
           <a:p>
             <a:pPr lvl="1"/>
             <a:r>
-              <a:rPr lang="en-US" dirty="0" smtClean="0"/>
+              <a:rPr lang="en-US" dirty="0"/>
               <a:t>6025 (Carlos Cardona) on guitar, briefly</a:t>
             </a:r>
           </a:p>
           <a:p>
             <a:pPr lvl="1"/>
             <a:r>
-              <a:rPr lang="en-US" dirty="0" smtClean="0"/>
+              <a:rPr lang="en-US" dirty="0"/>
               <a:t>Record label: </a:t>
             </a:r>
             <a:r>
-              <a:rPr lang="en-US" smtClean="0"/>
+              <a:rPr lang="en-US"/>
               <a:t>Alternative Tentacles</a:t>
             </a:r>
-            <a:endParaRPr lang="en-US" dirty="0" smtClean="0"/>
+            <a:endParaRPr lang="en-US" dirty="0"/>
           </a:p>
           <a:p>
             <a:r>
               <a:rPr lang="en-US" dirty="0">
                 <a:hlinkClick r:id="rId2"/>
               </a:rPr>
-              <a:t>https://</a:t>
-            </a:r>
-            <a:r>
-              <a:rPr lang="en-US" dirty="0" smtClean="0">
-                <a:hlinkClick r:id="rId2"/>
-              </a:rPr>
-              <a:t>www.youtube.com/watch?v=eIqESwzCGg4</a:t>
-            </a:r>
-            <a:endParaRPr lang="en-US" dirty="0" smtClean="0"/>
+              <a:t>https://www.youtube.com/watch?v=eIqESwzCGg4</a:t>
+            </a:r>
+            <a:endParaRPr lang="en-US" dirty="0"/>
           </a:p>
           <a:p>
             <a:endParaRPr lang="en-US" dirty="0"/>
@@ -3861,13 +3792,6 @@
   <p:clrMapOvr>
     <a:masterClrMapping/>
   </p:clrMapOvr>
-  <p:timing>
-    <p:tnLst>
-      <p:par>
-        <p:cTn id="1" dur="indefinite" restart="never" nodeType="tmRoot"/>
-      </p:par>
-    </p:tnLst>
-  </p:timing>
 </p:sld>
 </file>
 
@@ -3906,16 +3830,12 @@
           <a:lstStyle/>
           <a:p>
             <a:r>
-              <a:rPr lang="en-US" sz="7200" dirty="0" smtClean="0">
+              <a:rPr lang="en-US" sz="7200" dirty="0">
                 <a:latin typeface="Aharoni" panose="02010803020104030203" pitchFamily="2" charset="-79"/>
                 <a:cs typeface="Aharoni" panose="02010803020104030203" pitchFamily="2" charset="-79"/>
               </a:rPr>
               <a:t>The Clash, 1976-1986</a:t>
             </a:r>
-            <a:endParaRPr lang="en-US" sz="7200" dirty="0">
-              <a:latin typeface="Aharoni" panose="02010803020104030203" pitchFamily="2" charset="-79"/>
-              <a:cs typeface="Aharoni" panose="02010803020104030203" pitchFamily="2" charset="-79"/>
-            </a:endParaRPr>
           </a:p>
         </p:txBody>
       </p:sp>
@@ -3932,63 +3852,31 @@
         <p:spPr/>
         <p:txBody>
           <a:bodyPr>
-            <a:normAutofit lnSpcReduction="10000"/>
+            <a:normAutofit fontScale="92500" lnSpcReduction="10000"/>
           </a:bodyPr>
           <a:lstStyle/>
           <a:p>
             <a:r>
               <a:rPr lang="en-US" dirty="0"/>
-              <a:t> Joe Strummer </a:t>
-            </a:r>
-            <a:r>
-              <a:rPr lang="en-US" dirty="0" smtClean="0"/>
-              <a:t>(vocals</a:t>
-            </a:r>
-            <a:r>
-              <a:rPr lang="en-US" dirty="0"/>
-              <a:t>, rhythm </a:t>
-            </a:r>
-            <a:r>
-              <a:rPr lang="en-US" dirty="0" smtClean="0"/>
-              <a:t>guitar)</a:t>
-            </a:r>
-          </a:p>
-          <a:p>
-            <a:r>
-              <a:rPr lang="en-US" dirty="0" smtClean="0"/>
-              <a:t>Mick </a:t>
-            </a:r>
-            <a:r>
-              <a:rPr lang="en-US" dirty="0"/>
-              <a:t>Jones (lead guitar, </a:t>
-            </a:r>
-            <a:r>
-              <a:rPr lang="en-US" dirty="0" smtClean="0"/>
-              <a:t>vocals)</a:t>
-            </a:r>
-          </a:p>
-          <a:p>
-            <a:r>
-              <a:rPr lang="en-US" dirty="0" smtClean="0"/>
-              <a:t>Paul </a:t>
-            </a:r>
-            <a:r>
-              <a:rPr lang="en-US" dirty="0"/>
-              <a:t>Simonon (bass guitar, </a:t>
-            </a:r>
-            <a:r>
-              <a:rPr lang="en-US" dirty="0" smtClean="0"/>
-              <a:t>vocals)</a:t>
-            </a:r>
-          </a:p>
-          <a:p>
-            <a:r>
-              <a:rPr lang="en-US" dirty="0" smtClean="0"/>
-              <a:t>Nicky </a:t>
-            </a:r>
-            <a:r>
-              <a:rPr lang="en-US" dirty="0"/>
-              <a:t>"Topper" </a:t>
+              <a:t> Joe Strummer (vocals, rhythm guitar)</a:t>
+            </a:r>
+          </a:p>
+          <a:p>
+            <a:r>
+              <a:rPr lang="en-US" dirty="0"/>
+              <a:t>Mick Jones (lead guitar, vocals)</a:t>
+            </a:r>
+          </a:p>
+          <a:p>
+            <a:r>
+              <a:rPr lang="en-US" dirty="0"/>
+              <a:t>Paul Simonon (bass guitar, vocals)</a:t>
+            </a:r>
+          </a:p>
+          <a:p>
+            <a:r>
+              <a:rPr lang="en-US" dirty="0"/>
+              <a:t>Nicky "Topper" </a:t>
             </a:r>
             <a:r>
               <a:rPr lang="en-US" dirty="0" err="1"/>
@@ -3996,41 +3884,25 @@
             </a:r>
             <a:r>
               <a:rPr lang="en-US" dirty="0"/>
-              <a:t> (</a:t>
-            </a:r>
-            <a:r>
-              <a:rPr lang="en-US" dirty="0" smtClean="0"/>
-              <a:t>drums)</a:t>
-            </a:r>
-          </a:p>
-          <a:p>
-            <a:r>
-              <a:rPr lang="en-US" dirty="0" smtClean="0"/>
-              <a:t>Bernard Rhodes (manager, organizer, image-director)</a:t>
-            </a:r>
-          </a:p>
-          <a:p>
-            <a:r>
-              <a:rPr lang="en-US" dirty="0" smtClean="0"/>
+              <a:t> (drums)</a:t>
+            </a:r>
+          </a:p>
+          <a:p>
+            <a:r>
+              <a:rPr lang="en-US" dirty="0"/>
+              <a:t>Bernard Rhodes (manager, organizer, image-director), “An issue, an issue!”</a:t>
+            </a:r>
+          </a:p>
+          <a:p>
+            <a:r>
+              <a:rPr lang="en-US" dirty="0"/>
               <a:t>Sex Pistols were crucial.</a:t>
             </a:r>
           </a:p>
           <a:p>
             <a:r>
-              <a:rPr lang="en-US" dirty="0" smtClean="0"/>
-              <a:t>Joe Strummer: “</a:t>
-            </a:r>
-            <a:r>
-              <a:rPr lang="en-US" dirty="0"/>
-              <a:t>The Pistols came out that Tuesday evening and their attitude was </a:t>
-            </a:r>
-            <a:r>
-              <a:rPr lang="en-US" dirty="0" smtClean="0"/>
-              <a:t>‘Here's </a:t>
-            </a:r>
-            <a:r>
-              <a:rPr lang="en-US" dirty="0"/>
-              <a:t>our tunes, and we couldn't give a flying fuck whether you like them or not. In fact, we're </a:t>
+              <a:rPr lang="en-US" dirty="0"/>
+              <a:t>Joe Strummer: “The Pistols came out that Tuesday evening and their attitude was ‘Here's our tunes, and we couldn't give a flying fuck whether you like them or not. In fact, we're </a:t>
             </a:r>
             <a:r>
               <a:rPr lang="en-US" dirty="0" err="1"/>
@@ -4038,21 +3910,8 @@
             </a:r>
             <a:r>
               <a:rPr lang="en-US" dirty="0"/>
-              <a:t> play them even if you fucking hate them</a:t>
-            </a:r>
-            <a:r>
-              <a:rPr lang="en-US" dirty="0" smtClean="0"/>
-              <a:t>.’ </a:t>
-            </a:r>
-            <a:r>
-              <a:rPr lang="en-US" dirty="0"/>
-              <a:t>They were a really firing live unit</a:t>
-            </a:r>
-            <a:r>
-              <a:rPr lang="en-US" dirty="0" smtClean="0"/>
-              <a:t>.”</a:t>
-            </a:r>
-            <a:endParaRPr lang="en-US" dirty="0"/>
+              <a:t> play them even if you fucking hate them.’ They were a really firing live unit.”</a:t>
+            </a:r>
           </a:p>
         </p:txBody>
       </p:sp>
@@ -4066,13 +3925,6 @@
   <p:clrMapOvr>
     <a:masterClrMapping/>
   </p:clrMapOvr>
-  <p:timing>
-    <p:tnLst>
-      <p:par>
-        <p:cTn id="1" dur="indefinite" restart="never" nodeType="tmRoot"/>
-      </p:par>
-    </p:tnLst>
-  </p:timing>
 </p:sld>
 </file>
 
@@ -4126,7 +3978,7 @@
           <a:lstStyle/>
           <a:p>
             <a:r>
-              <a:rPr lang="en-US" sz="7200" dirty="0" smtClean="0">
+              <a:rPr lang="en-US" sz="7200" dirty="0">
                 <a:latin typeface="Aharoni" panose="02010803020104030203" pitchFamily="2" charset="-79"/>
                 <a:cs typeface="Aharoni" panose="02010803020104030203" pitchFamily="2" charset="-79"/>
               </a:rPr>
@@ -4154,24 +4006,47 @@
         </p:spPr>
         <p:txBody>
           <a:bodyPr>
-            <a:normAutofit fontScale="92500" lnSpcReduction="10000"/>
+            <a:normAutofit fontScale="92500" lnSpcReduction="20000"/>
           </a:bodyPr>
           <a:lstStyle/>
           <a:p>
             <a:r>
-              <a:rPr lang="en-US" dirty="0" smtClean="0"/>
+              <a:rPr lang="en-US" dirty="0"/>
+              <a:t>First performance: 4 July 1976, opened for the Pistols.</a:t>
+            </a:r>
+          </a:p>
+          <a:p>
+            <a:r>
+              <a:rPr lang="en-US" dirty="0"/>
               <a:t>January 1977: signed contract with CBS: 100,000 GBP</a:t>
             </a:r>
           </a:p>
           <a:p>
             <a:r>
-              <a:rPr lang="en-US" dirty="0" smtClean="0"/>
-              <a:t>Fans cried sell out.</a:t>
-            </a:r>
-          </a:p>
-          <a:p>
-            <a:r>
-              <a:rPr lang="en-US" dirty="0" smtClean="0"/>
+              <a:rPr lang="en-US" dirty="0"/>
+              <a:t>Many cried sell out. </a:t>
+            </a:r>
+            <a:r>
+              <a:rPr lang="en-US" i="1" dirty="0" err="1"/>
+              <a:t>Sniffin</a:t>
+            </a:r>
+            <a:r>
+              <a:rPr lang="en-US" i="1" dirty="0"/>
+              <a:t>’ glue: </a:t>
+            </a:r>
+            <a:r>
+              <a:rPr lang="en-US" dirty="0"/>
+              <a:t>“</a:t>
+            </a:r>
+            <a:r>
+              <a:rPr lang="en-CA" dirty="0"/>
+              <a:t>Punk died the day the Clash signed to CBS.”</a:t>
+            </a:r>
+            <a:endParaRPr lang="en-US" dirty="0"/>
+          </a:p>
+          <a:p>
+            <a:r>
+              <a:rPr lang="en-US" dirty="0"/>
               <a:t>Strummer said: </a:t>
             </a:r>
           </a:p>
@@ -4180,12 +4055,8 @@
               <a:buNone/>
             </a:pPr>
             <a:r>
-              <a:rPr lang="en-US" dirty="0" smtClean="0"/>
-              <a:t>“[</a:t>
-            </a:r>
-            <a:r>
-              <a:rPr lang="en-US" dirty="0"/>
-              <a:t>S]</a:t>
+              <a:rPr lang="en-US" dirty="0"/>
+              <a:t>“[S]</a:t>
             </a:r>
             <a:r>
               <a:rPr lang="en-US" dirty="0" err="1"/>
@@ -4201,46 +4072,40 @@
             </a:r>
             <a:r>
               <a:rPr lang="en-US" dirty="0"/>
-              <a:t> that all it boils down to is perhaps two-year's security ... Before, all I could think about was my stomach ... Now I feel free to think—and free to write down what I'm thinking about ... And look—I've been fucked about for so long I'm not going to suddenly turn into Rod Stewart just because I get £25.00 a week. I'm much too far gone for that, I tell </a:t>
-            </a:r>
-            <a:r>
-              <a:rPr lang="en-US" dirty="0" smtClean="0"/>
-              <a:t>you.”</a:t>
-            </a:r>
-            <a:endParaRPr lang="en-US" dirty="0"/>
-          </a:p>
-          <a:p>
-            <a:r>
-              <a:rPr lang="en-US" dirty="0" smtClean="0"/>
+              <a:t> that all it boils down to is perhaps two-year's security ... Before, all I could think about was my stomach ... Now I feel free to think—and free to write down what I'm thinking about ... And look—I've been fucked about for so long I'm not going to suddenly turn into Rod Stewart just because I get £25.00 a week. I'm much too far gone for that, I tell you.”</a:t>
+            </a:r>
+          </a:p>
+          <a:p>
+            <a:r>
+              <a:rPr lang="en-US" dirty="0"/>
               <a:t>First hit, “White Riot,” (released March 1977), reached no. 34.</a:t>
             </a:r>
           </a:p>
           <a:p>
             <a:r>
-              <a:rPr lang="en-US" dirty="0" smtClean="0"/>
+              <a:rPr lang="en-US" dirty="0"/>
               <a:t>First album, </a:t>
             </a:r>
             <a:r>
-              <a:rPr lang="en-US" i="1" dirty="0" smtClean="0"/>
+              <a:rPr lang="en-US" i="1" dirty="0"/>
               <a:t>The Clash </a:t>
             </a:r>
             <a:r>
-              <a:rPr lang="en-US" dirty="0" smtClean="0"/>
+              <a:rPr lang="en-US" dirty="0"/>
               <a:t>(April 1977)</a:t>
             </a:r>
           </a:p>
           <a:p>
             <a:r>
-              <a:rPr lang="en-US" dirty="0" smtClean="0"/>
+              <a:rPr lang="en-US" dirty="0"/>
               <a:t>CBS did not want to release it in USA</a:t>
             </a:r>
           </a:p>
           <a:p>
             <a:r>
-              <a:rPr lang="en-US" dirty="0" smtClean="0"/>
+              <a:rPr lang="en-US" dirty="0"/>
               <a:t>But sold massively as import.</a:t>
             </a:r>
-            <a:endParaRPr lang="en-US" dirty="0"/>
           </a:p>
         </p:txBody>
       </p:sp>
@@ -4254,13 +4119,6 @@
   <p:clrMapOvr>
     <a:masterClrMapping/>
   </p:clrMapOvr>
-  <p:timing>
-    <p:tnLst>
-      <p:par>
-        <p:cTn id="1" dur="indefinite" restart="never" nodeType="tmRoot"/>
-      </p:par>
-    </p:tnLst>
-  </p:timing>
 </p:sld>
 </file>
 
@@ -4299,7 +4157,7 @@
           <a:lstStyle/>
           <a:p>
             <a:r>
-              <a:rPr lang="en-US" sz="7200" dirty="0" smtClean="0">
+              <a:rPr lang="en-US" sz="7200" dirty="0">
                 <a:latin typeface="Aharoni" panose="02010803020104030203" pitchFamily="2" charset="-79"/>
                 <a:cs typeface="Aharoni" panose="02010803020104030203" pitchFamily="2" charset="-79"/>
               </a:rPr>
@@ -4330,30 +4188,30 @@
           <a:lstStyle/>
           <a:p>
             <a:r>
-              <a:rPr lang="en-US" dirty="0" smtClean="0"/>
+              <a:rPr lang="en-US" dirty="0"/>
               <a:t>Openly political band, especially Strummer.</a:t>
             </a:r>
           </a:p>
           <a:p>
             <a:r>
-              <a:rPr lang="en-US" dirty="0" smtClean="0"/>
+              <a:rPr lang="en-US" dirty="0"/>
               <a:t>Liege concert (August 1977) tried to pull down barbed wire.</a:t>
             </a:r>
           </a:p>
           <a:p>
             <a:r>
-              <a:rPr lang="en-US" dirty="0" smtClean="0"/>
+              <a:rPr lang="en-US" dirty="0"/>
               <a:t>Insisted on keeping album prices low.</a:t>
             </a:r>
           </a:p>
           <a:p>
             <a:r>
-              <a:rPr lang="en-US" dirty="0" smtClean="0"/>
+              <a:rPr lang="en-US" dirty="0"/>
               <a:t>Often performed for free and charity.</a:t>
             </a:r>
           </a:p>
           <a:p>
-            <a:endParaRPr lang="en-US" dirty="0" smtClean="0"/>
+            <a:endParaRPr lang="en-US" dirty="0"/>
           </a:p>
           <a:p>
             <a:endParaRPr lang="en-US" dirty="0"/>
@@ -4400,13 +4258,6 @@
   <p:clrMapOvr>
     <a:masterClrMapping/>
   </p:clrMapOvr>
-  <p:timing>
-    <p:tnLst>
-      <p:par>
-        <p:cTn id="1" dur="indefinite" restart="never" nodeType="tmRoot"/>
-      </p:par>
-    </p:tnLst>
-  </p:timing>
 </p:sld>
 </file>
 
@@ -4445,7 +4296,7 @@
           <a:lstStyle/>
           <a:p>
             <a:r>
-              <a:rPr lang="en-US" sz="7200" dirty="0" smtClean="0">
+              <a:rPr lang="en-US" sz="7200" dirty="0">
                 <a:latin typeface="Aharoni" panose="02010803020104030203" pitchFamily="2" charset="-79"/>
                 <a:cs typeface="Aharoni" panose="02010803020104030203" pitchFamily="2" charset="-79"/>
               </a:rPr>
@@ -4476,7 +4327,7 @@
           <a:lstStyle/>
           <a:p>
             <a:r>
-              <a:rPr lang="en-US" b="1" dirty="0" smtClean="0"/>
+              <a:rPr lang="en-US" b="1" dirty="0"/>
               <a:t>Second album, </a:t>
             </a:r>
             <a:r>
@@ -4489,29 +4340,25 @@
             </a:r>
             <a:r>
               <a:rPr lang="en-US" b="1" i="1" dirty="0"/>
-              <a:t> Enough </a:t>
-            </a:r>
-            <a:r>
-              <a:rPr lang="en-US" b="1" i="1" dirty="0" smtClean="0"/>
-              <a:t>Rope</a:t>
-            </a:r>
-            <a:r>
-              <a:rPr lang="en-US" b="1" dirty="0" smtClean="0"/>
+              <a:t> Enough Rope</a:t>
+            </a:r>
+            <a:r>
+              <a:rPr lang="en-US" b="1" dirty="0"/>
               <a:t>, (November 1978)</a:t>
             </a:r>
           </a:p>
           <a:p>
             <a:r>
-              <a:rPr lang="en-US" b="1" dirty="0" smtClean="0"/>
+              <a:rPr lang="en-US" b="1" dirty="0"/>
               <a:t>“Tommy Gun”: </a:t>
             </a:r>
             <a:r>
-              <a:rPr lang="en-US" dirty="0" smtClean="0">
+              <a:rPr lang="en-US" dirty="0">
                 <a:hlinkClick r:id="rId2"/>
               </a:rPr>
               <a:t>https://www.youtube.com/watch?v=VF1qW9tq_Vs</a:t>
             </a:r>
-            <a:endParaRPr lang="en-US" dirty="0" smtClean="0"/>
+            <a:endParaRPr lang="en-US" dirty="0"/>
           </a:p>
           <a:p>
             <a:endParaRPr lang="en-US" dirty="0"/>
@@ -4558,13 +4405,6 @@
   <p:clrMapOvr>
     <a:masterClrMapping/>
   </p:clrMapOvr>
-  <p:timing>
-    <p:tnLst>
-      <p:par>
-        <p:cTn id="1" dur="indefinite" restart="never" nodeType="tmRoot"/>
-      </p:par>
-    </p:tnLst>
-  </p:timing>
 </p:sld>
 </file>
 
@@ -4603,7 +4443,7 @@
           <a:lstStyle/>
           <a:p>
             <a:r>
-              <a:rPr lang="en-US" sz="7200" dirty="0" smtClean="0">
+              <a:rPr lang="en-US" sz="7200" dirty="0">
                 <a:latin typeface="Aharoni" panose="02010803020104030203" pitchFamily="2" charset="-79"/>
                 <a:cs typeface="Aharoni" panose="02010803020104030203" pitchFamily="2" charset="-79"/>
               </a:rPr>
@@ -4629,98 +4469,98 @@
           <a:lstStyle/>
           <a:p>
             <a:r>
-              <a:rPr lang="en-US" dirty="0" smtClean="0"/>
+              <a:rPr lang="en-US" dirty="0"/>
               <a:t>Third, defining album, </a:t>
             </a:r>
             <a:r>
-              <a:rPr lang="en-US" i="1" dirty="0" smtClean="0"/>
+              <a:rPr lang="en-US" i="1" dirty="0"/>
               <a:t>London Calling</a:t>
             </a:r>
             <a:r>
-              <a:rPr lang="en-US" dirty="0" smtClean="0"/>
+              <a:rPr lang="en-US" dirty="0"/>
               <a:t> (December 1979)</a:t>
             </a:r>
           </a:p>
           <a:p>
             <a:r>
-              <a:rPr lang="en-US" dirty="0" smtClean="0"/>
+              <a:rPr lang="en-US" dirty="0"/>
               <a:t>Considered the post-punk statement</a:t>
             </a:r>
           </a:p>
           <a:p>
             <a:r>
-              <a:rPr lang="en-US" dirty="0" smtClean="0"/>
+              <a:rPr lang="en-US" dirty="0"/>
               <a:t>Incorporated many genres: punk, </a:t>
             </a:r>
             <a:r>
-              <a:rPr lang="en-US" dirty="0" err="1" smtClean="0"/>
+              <a:rPr lang="en-US" dirty="0" err="1"/>
               <a:t>ska</a:t>
             </a:r>
             <a:r>
-              <a:rPr lang="en-US" dirty="0" smtClean="0"/>
+              <a:rPr lang="en-US" dirty="0"/>
               <a:t>, pub rock, rockabilly, reggae</a:t>
             </a:r>
             <a:r>
-              <a:rPr lang="en-US" smtClean="0"/>
+              <a:rPr lang="en-US"/>
               <a:t>, R&amp;B</a:t>
             </a:r>
             <a:r>
-              <a:rPr lang="en-US" dirty="0" smtClean="0"/>
+              <a:rPr lang="en-US" dirty="0"/>
               <a:t>, New Orleans pop, and experimentation.</a:t>
             </a:r>
           </a:p>
           <a:p>
             <a:r>
-              <a:rPr lang="en-US" dirty="0" smtClean="0"/>
+              <a:rPr lang="en-US" dirty="0"/>
               <a:t>Most songs strikingly political.</a:t>
             </a:r>
           </a:p>
           <a:p>
             <a:r>
-              <a:rPr lang="en-US" dirty="0" smtClean="0"/>
+              <a:rPr lang="en-US" dirty="0"/>
               <a:t>“London Calling”: </a:t>
             </a:r>
             <a:r>
-              <a:rPr lang="en-US" dirty="0" smtClean="0">
+              <a:rPr lang="en-US" dirty="0">
                 <a:hlinkClick r:id="rId2"/>
               </a:rPr>
               <a:t>https://www.youtube.com/watch?v=lotkzHsIuoA</a:t>
             </a:r>
-            <a:endParaRPr lang="en-US" dirty="0" smtClean="0"/>
-          </a:p>
-          <a:p>
-            <a:r>
-              <a:rPr lang="en-US" dirty="0" smtClean="0"/>
+            <a:endParaRPr lang="en-US" dirty="0"/>
+          </a:p>
+          <a:p>
+            <a:r>
+              <a:rPr lang="en-US" dirty="0"/>
               <a:t>“</a:t>
             </a:r>
             <a:r>
-              <a:rPr lang="en-US" dirty="0" err="1" smtClean="0"/>
+              <a:rPr lang="en-US" dirty="0" err="1"/>
               <a:t>Koka</a:t>
             </a:r>
             <a:r>
-              <a:rPr lang="en-US" dirty="0" smtClean="0"/>
+              <a:rPr lang="en-US" dirty="0"/>
               <a:t> Kola”: </a:t>
             </a:r>
             <a:r>
-              <a:rPr lang="en-US" dirty="0" smtClean="0">
+              <a:rPr lang="en-US" dirty="0">
                 <a:hlinkClick r:id="rId3"/>
               </a:rPr>
               <a:t>https://www.youtube.com/watch?v=AXphJS1HQmc</a:t>
             </a:r>
-            <a:endParaRPr lang="en-US" dirty="0" smtClean="0"/>
-          </a:p>
-          <a:p>
-            <a:r>
-              <a:rPr lang="en-US" dirty="0" smtClean="0"/>
+            <a:endParaRPr lang="en-US" dirty="0"/>
+          </a:p>
+          <a:p>
+            <a:r>
+              <a:rPr lang="en-US" dirty="0"/>
               <a:t>“Death or Glory”: </a:t>
             </a:r>
             <a:r>
-              <a:rPr lang="en-US" dirty="0" smtClean="0">
+              <a:rPr lang="en-US" dirty="0">
                 <a:hlinkClick r:id="rId4"/>
               </a:rPr>
               <a:t>https://www.youtube.com/watch?v=2NRSQBSZdKI</a:t>
             </a:r>
-            <a:endParaRPr lang="en-US" dirty="0" smtClean="0"/>
+            <a:endParaRPr lang="en-US" dirty="0"/>
           </a:p>
           <a:p>
             <a:endParaRPr lang="en-US" dirty="0"/>
@@ -4737,13 +4577,6 @@
   <p:clrMapOvr>
     <a:masterClrMapping/>
   </p:clrMapOvr>
-  <p:timing>
-    <p:tnLst>
-      <p:par>
-        <p:cTn id="1" dur="indefinite" restart="never" nodeType="tmRoot"/>
-      </p:par>
-    </p:tnLst>
-  </p:timing>
 </p:sld>
 </file>
 
@@ -4792,21 +4625,17 @@
         <p:spPr/>
         <p:txBody>
           <a:bodyPr>
-            <a:normAutofit/>
+            <a:normAutofit fontScale="90000"/>
           </a:bodyPr>
           <a:lstStyle/>
           <a:p>
             <a:r>
-              <a:rPr lang="en-US" sz="8000" dirty="0" smtClean="0">
+              <a:rPr lang="en-US" sz="8000" dirty="0">
                 <a:latin typeface="Aharoni" panose="02010803020104030203" pitchFamily="2" charset="-79"/>
                 <a:cs typeface="Aharoni" panose="02010803020104030203" pitchFamily="2" charset="-79"/>
               </a:rPr>
               <a:t>Joy Division, 1976-1980</a:t>
             </a:r>
-            <a:endParaRPr lang="en-US" sz="8000" dirty="0">
-              <a:latin typeface="Aharoni" panose="02010803020104030203" pitchFamily="2" charset="-79"/>
-              <a:cs typeface="Aharoni" panose="02010803020104030203" pitchFamily="2" charset="-79"/>
-            </a:endParaRPr>
           </a:p>
         </p:txBody>
       </p:sp>
@@ -4833,65 +4662,53 @@
           <a:lstStyle/>
           <a:p>
             <a:r>
-              <a:rPr lang="en-US" dirty="0" err="1" smtClean="0"/>
+              <a:rPr lang="en-US" dirty="0" err="1"/>
               <a:t>Salford</a:t>
             </a:r>
             <a:r>
-              <a:rPr lang="en-US" dirty="0" smtClean="0"/>
+              <a:rPr lang="en-US" dirty="0"/>
               <a:t>, Manchester, working class boys</a:t>
             </a:r>
           </a:p>
           <a:p>
             <a:r>
-              <a:rPr lang="en-US" dirty="0" smtClean="0"/>
+              <a:rPr lang="en-US" dirty="0"/>
               <a:t>Met at Sex Pistols concert</a:t>
             </a:r>
           </a:p>
           <a:p>
             <a:r>
               <a:rPr lang="en-US" dirty="0"/>
-              <a:t> Ian </a:t>
-            </a:r>
-            <a:r>
-              <a:rPr lang="en-US" dirty="0" smtClean="0"/>
-              <a:t>Curtis (vocals)</a:t>
-            </a:r>
-          </a:p>
-          <a:p>
-            <a:r>
-              <a:rPr lang="en-US" dirty="0" smtClean="0"/>
+              <a:t> Ian Curtis (vocals)</a:t>
+            </a:r>
+          </a:p>
+          <a:p>
+            <a:r>
+              <a:rPr lang="en-US" dirty="0"/>
               <a:t>Bernard Sumner (guitar, keyboards)</a:t>
             </a:r>
           </a:p>
           <a:p>
             <a:r>
-              <a:rPr lang="en-US" dirty="0" smtClean="0"/>
+              <a:rPr lang="en-US" dirty="0"/>
               <a:t>Peter Hook (bass)</a:t>
             </a:r>
           </a:p>
           <a:p>
             <a:r>
-              <a:rPr lang="en-US" dirty="0" smtClean="0"/>
+              <a:rPr lang="en-US" dirty="0"/>
               <a:t>Stephen Morris (drums)</a:t>
             </a:r>
           </a:p>
           <a:p>
             <a:r>
-              <a:rPr lang="en-US" dirty="0" smtClean="0"/>
-              <a:t>Original name, “</a:t>
-            </a:r>
-            <a:r>
-              <a:rPr lang="en-US" dirty="0"/>
-              <a:t>S</a:t>
-            </a:r>
-            <a:r>
-              <a:rPr lang="en-US" dirty="0" smtClean="0"/>
-              <a:t>tiff Kittens,” then “Warsaw.”</a:t>
-            </a:r>
-          </a:p>
-          <a:p>
-            <a:r>
-              <a:rPr lang="en-US" dirty="0" smtClean="0"/>
+              <a:rPr lang="en-US" dirty="0"/>
+              <a:t>Original name, “Stiff Kittens,” then “Warsaw.”</a:t>
+            </a:r>
+          </a:p>
+          <a:p>
+            <a:r>
+              <a:rPr lang="en-US" dirty="0"/>
               <a:t>Tony Wilson signed them to his record company, Factory Records.</a:t>
             </a:r>
           </a:p>
@@ -4937,13 +4754,6 @@
   <p:clrMapOvr>
     <a:masterClrMapping/>
   </p:clrMapOvr>
-  <p:timing>
-    <p:tnLst>
-      <p:par>
-        <p:cTn id="1" dur="indefinite" restart="never" nodeType="tmRoot"/>
-      </p:par>
-    </p:tnLst>
-  </p:timing>
 </p:sld>
 </file>
 
@@ -4992,21 +4802,17 @@
         <p:spPr/>
         <p:txBody>
           <a:bodyPr>
-            <a:normAutofit/>
+            <a:normAutofit fontScale="90000"/>
           </a:bodyPr>
           <a:lstStyle/>
           <a:p>
             <a:r>
-              <a:rPr lang="en-US" sz="8000" dirty="0" smtClean="0">
+              <a:rPr lang="en-US" sz="8000" dirty="0">
                 <a:latin typeface="Aharoni" panose="02010803020104030203" pitchFamily="2" charset="-79"/>
                 <a:cs typeface="Aharoni" panose="02010803020104030203" pitchFamily="2" charset="-79"/>
               </a:rPr>
               <a:t>Joy Division, 1976-1980</a:t>
             </a:r>
-            <a:endParaRPr lang="en-US" sz="8000" dirty="0">
-              <a:latin typeface="Aharoni" panose="02010803020104030203" pitchFamily="2" charset="-79"/>
-              <a:cs typeface="Aharoni" panose="02010803020104030203" pitchFamily="2" charset="-79"/>
-            </a:endParaRPr>
           </a:p>
         </p:txBody>
       </p:sp>
@@ -5033,90 +4839,88 @@
           <a:lstStyle/>
           <a:p>
             <a:r>
-              <a:rPr lang="en-US" dirty="0" smtClean="0"/>
+              <a:rPr lang="en-US" dirty="0"/>
               <a:t>First Album, </a:t>
             </a:r>
             <a:r>
-              <a:rPr lang="en-US" i="1" dirty="0" smtClean="0"/>
+              <a:rPr lang="en-US" i="1" dirty="0"/>
               <a:t>Unknown Pleasures </a:t>
             </a:r>
             <a:r>
-              <a:rPr lang="en-US" dirty="0" smtClean="0"/>
+              <a:rPr lang="en-US" dirty="0"/>
               <a:t>(1979)</a:t>
             </a:r>
           </a:p>
           <a:p>
             <a:r>
-              <a:rPr lang="en-US" dirty="0" smtClean="0"/>
+              <a:rPr lang="en-US" dirty="0"/>
               <a:t>“She’s Lost Control”: </a:t>
             </a:r>
             <a:r>
-              <a:rPr lang="en-US" dirty="0" smtClean="0">
+              <a:rPr lang="en-US" dirty="0">
                 <a:hlinkClick r:id="rId3"/>
               </a:rPr>
               <a:t>https://www.youtube.com/watch?v=xd0bH8EmdlQ</a:t>
             </a:r>
-            <a:endParaRPr lang="en-US" dirty="0" smtClean="0"/>
-          </a:p>
-          <a:p>
-            <a:r>
-              <a:rPr lang="en-US" dirty="0" smtClean="0"/>
+            <a:endParaRPr lang="en-US" dirty="0"/>
+          </a:p>
+          <a:p>
+            <a:r>
+              <a:rPr lang="en-US" dirty="0"/>
               <a:t>Second Album: Closer (1980)</a:t>
             </a:r>
-            <a:endParaRPr lang="en-US" dirty="0"/>
-          </a:p>
-          <a:p>
-            <a:r>
-              <a:rPr lang="en-US" dirty="0" smtClean="0"/>
+          </a:p>
+          <a:p>
+            <a:r>
+              <a:rPr lang="en-US" dirty="0"/>
               <a:t>“Transmission”: </a:t>
             </a:r>
             <a:r>
-              <a:rPr lang="en-US" dirty="0" smtClean="0">
+              <a:rPr lang="en-US" dirty="0">
                 <a:hlinkClick r:id="rId4"/>
               </a:rPr>
               <a:t>https://www.youtube.com/watch?v=Ou-hvgEb-BU</a:t>
             </a:r>
-            <a:endParaRPr lang="en-US" dirty="0" smtClean="0"/>
-          </a:p>
-          <a:p>
-            <a:r>
-              <a:rPr lang="en-US" dirty="0" smtClean="0"/>
+            <a:endParaRPr lang="en-US" dirty="0"/>
+          </a:p>
+          <a:p>
+            <a:r>
+              <a:rPr lang="en-US" dirty="0"/>
               <a:t>Curtis committed suicide, 18 May 1980</a:t>
             </a:r>
           </a:p>
           <a:p>
             <a:r>
-              <a:rPr lang="en-US" dirty="0" smtClean="0"/>
+              <a:rPr lang="en-US" dirty="0"/>
               <a:t>Post-</a:t>
             </a:r>
             <a:r>
-              <a:rPr lang="en-US" dirty="0" err="1" smtClean="0"/>
+              <a:rPr lang="en-US" dirty="0" err="1"/>
               <a:t>humously</a:t>
             </a:r>
             <a:r>
-              <a:rPr lang="en-US" dirty="0" smtClean="0"/>
+              <a:rPr lang="en-US" dirty="0"/>
               <a:t> released “Love will tear us apart”: </a:t>
             </a:r>
             <a:r>
-              <a:rPr lang="en-US" dirty="0" smtClean="0">
+              <a:rPr lang="en-US" dirty="0">
                 <a:hlinkClick r:id="rId5"/>
               </a:rPr>
               <a:t>https://www.youtube.com/watch?v=I-2i2SR_OsU</a:t>
             </a:r>
-            <a:endParaRPr lang="en-US" dirty="0" smtClean="0"/>
-          </a:p>
-          <a:p>
-            <a:r>
-              <a:rPr lang="en-US" dirty="0" smtClean="0"/>
+            <a:endParaRPr lang="en-US" dirty="0"/>
+          </a:p>
+          <a:p>
+            <a:r>
+              <a:rPr lang="en-US" dirty="0"/>
               <a:t>First chart hit, reaching no. 13 in UK, and no. 1 in New Zealand.</a:t>
             </a:r>
           </a:p>
           <a:p>
             <a:r>
-              <a:rPr lang="en-US" dirty="0" smtClean="0"/>
+              <a:rPr lang="en-US" dirty="0"/>
               <a:t>Led to New Order, formed from remaining members, later added Gillian Gilbert (keyboard and guitar).</a:t>
             </a:r>
-            <a:endParaRPr lang="en-US" dirty="0"/>
           </a:p>
         </p:txBody>
       </p:sp>
@@ -5130,13 +4934,6 @@
   <p:clrMapOvr>
     <a:masterClrMapping/>
   </p:clrMapOvr>
-  <p:timing>
-    <p:tnLst>
-      <p:par>
-        <p:cTn id="1" dur="indefinite" restart="never" nodeType="tmRoot"/>
-      </p:par>
-    </p:tnLst>
-  </p:timing>
 </p:sld>
 </file>
 
@@ -5175,10 +4972,9 @@
           <a:lstStyle/>
           <a:p>
             <a:r>
-              <a:rPr lang="en-US" sz="6600" b="1" dirty="0" smtClean="0"/>
+              <a:rPr lang="en-US" sz="6600" b="1" dirty="0"/>
               <a:t>California Post-Punk: Hardcore</a:t>
             </a:r>
-            <a:endParaRPr lang="en-US" sz="6600" b="1" dirty="0"/>
           </a:p>
         </p:txBody>
       </p:sp>
@@ -5200,19 +4996,14 @@
           <a:lstStyle/>
           <a:p>
             <a:r>
-              <a:rPr lang="en-US" b="1" dirty="0" smtClean="0"/>
-              <a:t>X (formed 1977</a:t>
-            </a:r>
-            <a:r>
               <a:rPr lang="en-US" b="1" dirty="0"/>
-              <a:t>): </a:t>
-            </a:r>
-            <a:endParaRPr lang="en-US" b="1" dirty="0" smtClean="0"/>
+              <a:t>X (formed 1977): </a:t>
+            </a:r>
           </a:p>
           <a:p>
             <a:pPr lvl="1"/>
             <a:r>
-              <a:rPr lang="en-US" dirty="0" smtClean="0"/>
+              <a:rPr lang="en-US" dirty="0"/>
               <a:t>vocalist </a:t>
             </a:r>
             <a:r>
@@ -5224,56 +5015,36 @@
               <a:t> </a:t>
             </a:r>
             <a:r>
-              <a:rPr lang="en-US" dirty="0" err="1" smtClean="0"/>
+              <a:rPr lang="en-US" dirty="0" err="1"/>
               <a:t>Cervenka</a:t>
             </a:r>
-            <a:endParaRPr lang="en-US" dirty="0" smtClean="0"/>
+            <a:endParaRPr lang="en-US" dirty="0"/>
           </a:p>
           <a:p>
             <a:pPr lvl="1"/>
             <a:r>
-              <a:rPr lang="en-US" dirty="0" smtClean="0"/>
-              <a:t>vocalist/bassist </a:t>
-            </a:r>
-            <a:r>
-              <a:rPr lang="en-US" dirty="0"/>
-              <a:t>John </a:t>
-            </a:r>
-            <a:r>
-              <a:rPr lang="en-US" dirty="0" smtClean="0"/>
-              <a:t>Doe</a:t>
+              <a:rPr lang="en-US" dirty="0"/>
+              <a:t>vocalist/bassist John Doe</a:t>
             </a:r>
           </a:p>
           <a:p>
             <a:pPr lvl="1"/>
             <a:r>
-              <a:rPr lang="en-US" dirty="0" smtClean="0"/>
-              <a:t>guitarist </a:t>
-            </a:r>
-            <a:r>
-              <a:rPr lang="en-US" dirty="0"/>
-              <a:t>Billy </a:t>
-            </a:r>
-            <a:r>
-              <a:rPr lang="en-US" dirty="0" smtClean="0"/>
-              <a:t>Zoom</a:t>
+              <a:rPr lang="en-US" dirty="0"/>
+              <a:t>guitarist Billy Zoom</a:t>
             </a:r>
           </a:p>
           <a:p>
             <a:pPr lvl="1"/>
             <a:r>
-              <a:rPr lang="en-US" dirty="0" smtClean="0"/>
-              <a:t>drummer </a:t>
-            </a:r>
-            <a:r>
-              <a:rPr lang="en-US" dirty="0"/>
-              <a:t>D. J. </a:t>
-            </a:r>
-            <a:r>
-              <a:rPr lang="en-US" dirty="0" err="1" smtClean="0"/>
+              <a:rPr lang="en-US" dirty="0"/>
+              <a:t>drummer D. J. </a:t>
+            </a:r>
+            <a:r>
+              <a:rPr lang="en-US" dirty="0" err="1"/>
               <a:t>Bonebrake</a:t>
             </a:r>
-            <a:endParaRPr lang="en-US" dirty="0" smtClean="0"/>
+            <a:endParaRPr lang="en-US" dirty="0"/>
           </a:p>
           <a:p>
             <a:pPr lvl="1"/>
@@ -5281,73 +5052,67 @@
               <a:rPr lang="en-US" dirty="0">
                 <a:hlinkClick r:id="rId2"/>
               </a:rPr>
-              <a:t>https://</a:t>
-            </a:r>
-            <a:r>
-              <a:rPr lang="en-US" dirty="0" smtClean="0">
-                <a:hlinkClick r:id="rId2"/>
-              </a:rPr>
-              <a:t>www.youtube.com/watch?v=ojBc4c1hX_4</a:t>
-            </a:r>
-            <a:endParaRPr lang="en-US" dirty="0" smtClean="0"/>
+              <a:t>https://www.youtube.com/watch?v=ojBc4c1hX_4</a:t>
+            </a:r>
+            <a:endParaRPr lang="en-US" dirty="0"/>
           </a:p>
           <a:p>
             <a:pPr marL="457200" lvl="1" indent="0">
               <a:buNone/>
             </a:pPr>
-            <a:endParaRPr lang="en-US" dirty="0" smtClean="0"/>
-          </a:p>
-          <a:p>
-            <a:r>
-              <a:rPr lang="en-US" b="1" dirty="0" smtClean="0"/>
+            <a:endParaRPr lang="en-US" dirty="0"/>
+          </a:p>
+          <a:p>
+            <a:r>
+              <a:rPr lang="en-US" b="1" dirty="0"/>
               <a:t>Black Flag (formed 1976):</a:t>
             </a:r>
           </a:p>
           <a:p>
             <a:pPr lvl="1"/>
             <a:r>
-              <a:rPr lang="en-US" dirty="0" smtClean="0"/>
+              <a:rPr lang="en-US" dirty="0"/>
               <a:t>Founder: Greg </a:t>
             </a:r>
             <a:r>
-              <a:rPr lang="en-US" dirty="0" err="1" smtClean="0"/>
+              <a:rPr lang="en-US" dirty="0" err="1"/>
               <a:t>Ginn</a:t>
             </a:r>
             <a:r>
-              <a:rPr lang="en-US" dirty="0" smtClean="0"/>
+              <a:rPr lang="en-US" dirty="0"/>
               <a:t> (guitar, song-writer, </a:t>
             </a:r>
             <a:r>
-              <a:rPr lang="en-US" dirty="0" err="1" smtClean="0"/>
+              <a:rPr lang="en-US" dirty="0" err="1"/>
               <a:t>etc</a:t>
             </a:r>
             <a:r>
-              <a:rPr lang="en-US" dirty="0" smtClean="0"/>
+              <a:rPr lang="en-US" dirty="0"/>
               <a:t>)</a:t>
             </a:r>
           </a:p>
           <a:p>
             <a:pPr lvl="1"/>
             <a:r>
-              <a:rPr lang="en-US" dirty="0" smtClean="0"/>
+              <a:rPr lang="en-US" dirty="0"/>
               <a:t>Henry Rollins (1981-1986)</a:t>
             </a:r>
           </a:p>
           <a:p>
             <a:pPr lvl="1"/>
             <a:r>
-              <a:rPr lang="en-US" dirty="0" smtClean="0">
+              <a:rPr lang="en-US" dirty="0">
                 <a:hlinkClick r:id="rId3"/>
               </a:rPr>
               <a:t>https://www.youtube.com/watch?v=Fsbvo5GVK10</a:t>
             </a:r>
-            <a:endParaRPr lang="en-US" dirty="0" smtClean="0"/>
-          </a:p>
-          <a:p>
-            <a:endParaRPr lang="en-US" dirty="0" smtClean="0"/>
-          </a:p>
-          <a:p>
-            <a:endParaRPr lang="en-US" dirty="0" smtClean="0"/>
+            <a:endParaRPr lang="en-US" dirty="0"/>
+          </a:p>
+          <a:p>
+            <a:endParaRPr lang="en-US" dirty="0"/>
+          </a:p>
+          <a:p>
+            <a:endParaRPr lang="en-US" dirty="0"/>
           </a:p>
         </p:txBody>
       </p:sp>
@@ -5361,13 +5126,6 @@
   <p:clrMapOvr>
     <a:masterClrMapping/>
   </p:clrMapOvr>
-  <p:timing>
-    <p:tnLst>
-      <p:par>
-        <p:cTn id="1" dur="indefinite" restart="never" nodeType="tmRoot"/>
-      </p:par>
-    </p:tnLst>
-  </p:timing>
 </p:sld>
 </file>
 

</xml_diff>